<commit_message>
CurProj slide updates 2/18/15
</commit_message>
<xml_diff>
--- a/analysis/reports/current_projects_20150218/makefigs.pptx
+++ b/analysis/reports/current_projects_20150218/makefigs.pptx
@@ -3913,7 +3913,7 @@
         </p:nvCxnSpPr>
         <p:spPr>
           <a:xfrm>
-            <a:off x="7348816" y="2572771"/>
+            <a:off x="7348816" y="2591448"/>
             <a:ext cx="0" cy="532297"/>
           </a:xfrm>
           <a:prstGeom prst="line">
@@ -3981,6 +3981,13 @@
   <p:clrMapOvr>
     <a:masterClrMapping/>
   </p:clrMapOvr>
+  <p:timing>
+    <p:tnLst>
+      <p:par>
+        <p:cTn xmlns:p14="http://schemas.microsoft.com/office/powerpoint/2010/main" id="1" dur="indefinite" restart="never" nodeType="tmRoot"/>
+      </p:par>
+    </p:tnLst>
+  </p:timing>
 </p:sld>
 </file>
 

</xml_diff>